<commit_message>
added vidualizations to slides
</commit_message>
<xml_diff>
--- a/established_personas.pptx
+++ b/established_personas.pptx
@@ -5216,6 +5216,179 @@
           <a:chExt cx="0" cy="0"/>
         </a:xfrm>
       </p:grpSpPr>
+      <p:grpSp>
+        <p:nvGrpSpPr>
+          <p:cNvPr id="189" name="Google Shape;189;p28"/>
+          <p:cNvGrpSpPr/>
+          <p:nvPr/>
+        </p:nvGrpSpPr>
+        <p:grpSpPr>
+          <a:xfrm>
+            <a:off x="9593569" y="0"/>
+            <a:ext cx="2650000" cy="6857998"/>
+            <a:chOff x="7195175" y="121671"/>
+            <a:chExt cx="1987500" cy="5143500"/>
+          </a:xfrm>
+          <a:solidFill>
+            <a:schemeClr val="lt2"/>
+          </a:solidFill>
+        </p:grpSpPr>
+        <p:sp>
+          <p:nvSpPr>
+            <p:cNvPr id="190" name="Google Shape;190;p28"/>
+            <p:cNvSpPr/>
+            <p:nvPr/>
+          </p:nvSpPr>
+          <p:spPr>
+            <a:xfrm>
+              <a:off x="7195175" y="121671"/>
+              <a:ext cx="1987500" cy="5143500"/>
+            </a:xfrm>
+            <a:prstGeom prst="rect">
+              <a:avLst/>
+            </a:prstGeom>
+            <a:grpFill/>
+            <a:ln>
+              <a:noFill/>
+            </a:ln>
+          </p:spPr>
+          <p:txBody>
+            <a:bodyPr spcFirstLastPara="1" wrap="square" lIns="121900" tIns="121900" rIns="121900" bIns="121900" anchor="ctr" anchorCtr="0">
+              <a:noAutofit/>
+            </a:bodyPr>
+            <a:lstStyle/>
+            <a:p>
+              <a:endParaRPr sz="2400" dirty="0">
+                <a:solidFill>
+                  <a:srgbClr val="00297F"/>
+                </a:solidFill>
+              </a:endParaRPr>
+            </a:p>
+          </p:txBody>
+        </p:sp>
+        <p:sp>
+          <p:nvSpPr>
+            <p:cNvPr id="191" name="Google Shape;191;p28"/>
+            <p:cNvSpPr txBox="1"/>
+            <p:nvPr/>
+          </p:nvSpPr>
+          <p:spPr>
+            <a:xfrm>
+              <a:off x="7305275" y="1540955"/>
+              <a:ext cx="1806000" cy="545100"/>
+            </a:xfrm>
+            <a:prstGeom prst="rect">
+              <a:avLst/>
+            </a:prstGeom>
+            <a:grpFill/>
+            <a:ln>
+              <a:noFill/>
+            </a:ln>
+          </p:spPr>
+          <p:txBody>
+            <a:bodyPr spcFirstLastPara="1" wrap="square" lIns="121900" tIns="121900" rIns="121900" bIns="121900" anchor="t" anchorCtr="0">
+              <a:noAutofit/>
+            </a:bodyPr>
+            <a:lstStyle/>
+            <a:p>
+              <a:pPr>
+                <a:lnSpc>
+                  <a:spcPct val="150000"/>
+                </a:lnSpc>
+              </a:pPr>
+              <a:r>
+                <a:rPr lang="en" sz="1333" b="1" dirty="0">
+                  <a:solidFill>
+                    <a:srgbClr val="00297F"/>
+                  </a:solidFill>
+                  <a:latin typeface="Lato"/>
+                  <a:ea typeface="Lato"/>
+                  <a:cs typeface="Lato"/>
+                  <a:sym typeface="Lato"/>
+                </a:rPr>
+                <a:t>Job Titles</a:t>
+              </a:r>
+              <a:endParaRPr sz="1333" b="1" dirty="0">
+                <a:solidFill>
+                  <a:srgbClr val="00297F"/>
+                </a:solidFill>
+                <a:latin typeface="Lato"/>
+                <a:ea typeface="Lato"/>
+                <a:cs typeface="Lato"/>
+                <a:sym typeface="Lato"/>
+              </a:endParaRPr>
+            </a:p>
+            <a:p>
+              <a:pPr>
+                <a:lnSpc>
+                  <a:spcPct val="150000"/>
+                </a:lnSpc>
+              </a:pPr>
+              <a:endParaRPr sz="1333" dirty="0">
+                <a:solidFill>
+                  <a:srgbClr val="00297F"/>
+                </a:solidFill>
+                <a:latin typeface="Lato"/>
+                <a:ea typeface="Lato"/>
+                <a:cs typeface="Lato"/>
+                <a:sym typeface="Lato"/>
+              </a:endParaRPr>
+            </a:p>
+          </p:txBody>
+        </p:sp>
+        <p:cxnSp>
+          <p:nvCxnSpPr>
+            <p:cNvPr id="206" name="Google Shape;206;p28"/>
+            <p:cNvCxnSpPr/>
+            <p:nvPr/>
+          </p:nvCxnSpPr>
+          <p:spPr>
+            <a:xfrm>
+              <a:off x="7237050" y="3447291"/>
+              <a:ext cx="1896000" cy="0"/>
+            </a:xfrm>
+            <a:prstGeom prst="straightConnector1">
+              <a:avLst/>
+            </a:prstGeom>
+            <a:grpFill/>
+            <a:ln w="9525" cap="flat" cmpd="sng">
+              <a:solidFill>
+                <a:schemeClr val="dk2"/>
+              </a:solidFill>
+              <a:prstDash val="dot"/>
+              <a:round/>
+              <a:headEnd type="none" w="med" len="med"/>
+              <a:tailEnd type="none" w="med" len="med"/>
+            </a:ln>
+          </p:spPr>
+        </p:cxnSp>
+        <p:cxnSp>
+          <p:nvCxnSpPr>
+            <p:cNvPr id="207" name="Google Shape;207;p28"/>
+            <p:cNvCxnSpPr/>
+            <p:nvPr/>
+          </p:nvCxnSpPr>
+          <p:spPr>
+            <a:xfrm>
+              <a:off x="7232075" y="1589196"/>
+              <a:ext cx="1896000" cy="0"/>
+            </a:xfrm>
+            <a:prstGeom prst="straightConnector1">
+              <a:avLst/>
+            </a:prstGeom>
+            <a:grpFill/>
+            <a:ln w="9525" cap="flat" cmpd="sng">
+              <a:solidFill>
+                <a:schemeClr val="dk2"/>
+              </a:solidFill>
+              <a:prstDash val="dot"/>
+              <a:round/>
+              <a:headEnd type="none" w="med" len="med"/>
+              <a:tailEnd type="none" w="med" len="med"/>
+            </a:ln>
+          </p:spPr>
+        </p:cxnSp>
+      </p:grpSp>
       <p:sp>
         <p:nvSpPr>
           <p:cNvPr id="179" name="Google Shape;179;p28"/>
@@ -6341,179 +6514,6 @@
           </a:p>
         </p:txBody>
       </p:sp>
-      <p:grpSp>
-        <p:nvGrpSpPr>
-          <p:cNvPr id="189" name="Google Shape;189;p28"/>
-          <p:cNvGrpSpPr/>
-          <p:nvPr/>
-        </p:nvGrpSpPr>
-        <p:grpSpPr>
-          <a:xfrm>
-            <a:off x="9593569" y="0"/>
-            <a:ext cx="2650000" cy="6857998"/>
-            <a:chOff x="7195175" y="0"/>
-            <a:chExt cx="1987500" cy="5143500"/>
-          </a:xfrm>
-          <a:solidFill>
-            <a:schemeClr val="lt2"/>
-          </a:solidFill>
-        </p:grpSpPr>
-        <p:sp>
-          <p:nvSpPr>
-            <p:cNvPr id="190" name="Google Shape;190;p28"/>
-            <p:cNvSpPr/>
-            <p:nvPr/>
-          </p:nvSpPr>
-          <p:spPr>
-            <a:xfrm>
-              <a:off x="7195175" y="0"/>
-              <a:ext cx="1987500" cy="5143500"/>
-            </a:xfrm>
-            <a:prstGeom prst="rect">
-              <a:avLst/>
-            </a:prstGeom>
-            <a:grpFill/>
-            <a:ln>
-              <a:noFill/>
-            </a:ln>
-          </p:spPr>
-          <p:txBody>
-            <a:bodyPr spcFirstLastPara="1" wrap="square" lIns="121900" tIns="121900" rIns="121900" bIns="121900" anchor="ctr" anchorCtr="0">
-              <a:noAutofit/>
-            </a:bodyPr>
-            <a:lstStyle/>
-            <a:p>
-              <a:endParaRPr sz="2400" dirty="0">
-                <a:solidFill>
-                  <a:srgbClr val="00297F"/>
-                </a:solidFill>
-              </a:endParaRPr>
-            </a:p>
-          </p:txBody>
-        </p:sp>
-        <p:sp>
-          <p:nvSpPr>
-            <p:cNvPr id="191" name="Google Shape;191;p28"/>
-            <p:cNvSpPr txBox="1"/>
-            <p:nvPr/>
-          </p:nvSpPr>
-          <p:spPr>
-            <a:xfrm>
-              <a:off x="7305275" y="1806425"/>
-              <a:ext cx="1806000" cy="545100"/>
-            </a:xfrm>
-            <a:prstGeom prst="rect">
-              <a:avLst/>
-            </a:prstGeom>
-            <a:grpFill/>
-            <a:ln>
-              <a:noFill/>
-            </a:ln>
-          </p:spPr>
-          <p:txBody>
-            <a:bodyPr spcFirstLastPara="1" wrap="square" lIns="121900" tIns="121900" rIns="121900" bIns="121900" anchor="t" anchorCtr="0">
-              <a:noAutofit/>
-            </a:bodyPr>
-            <a:lstStyle/>
-            <a:p>
-              <a:pPr>
-                <a:lnSpc>
-                  <a:spcPct val="150000"/>
-                </a:lnSpc>
-              </a:pPr>
-              <a:r>
-                <a:rPr lang="en" sz="1333" b="1">
-                  <a:solidFill>
-                    <a:srgbClr val="00297F"/>
-                  </a:solidFill>
-                  <a:latin typeface="Lato"/>
-                  <a:ea typeface="Lato"/>
-                  <a:cs typeface="Lato"/>
-                  <a:sym typeface="Lato"/>
-                </a:rPr>
-                <a:t>Job Titles</a:t>
-              </a:r>
-              <a:endParaRPr sz="1333" b="1">
-                <a:solidFill>
-                  <a:srgbClr val="00297F"/>
-                </a:solidFill>
-                <a:latin typeface="Lato"/>
-                <a:ea typeface="Lato"/>
-                <a:cs typeface="Lato"/>
-                <a:sym typeface="Lato"/>
-              </a:endParaRPr>
-            </a:p>
-            <a:p>
-              <a:pPr>
-                <a:lnSpc>
-                  <a:spcPct val="150000"/>
-                </a:lnSpc>
-              </a:pPr>
-              <a:endParaRPr sz="1333">
-                <a:solidFill>
-                  <a:srgbClr val="00297F"/>
-                </a:solidFill>
-                <a:latin typeface="Lato"/>
-                <a:ea typeface="Lato"/>
-                <a:cs typeface="Lato"/>
-                <a:sym typeface="Lato"/>
-              </a:endParaRPr>
-            </a:p>
-          </p:txBody>
-        </p:sp>
-        <p:cxnSp>
-          <p:nvCxnSpPr>
-            <p:cNvPr id="206" name="Google Shape;206;p28"/>
-            <p:cNvCxnSpPr/>
-            <p:nvPr/>
-          </p:nvCxnSpPr>
-          <p:spPr>
-            <a:xfrm>
-              <a:off x="7237050" y="3181825"/>
-              <a:ext cx="1896000" cy="0"/>
-            </a:xfrm>
-            <a:prstGeom prst="straightConnector1">
-              <a:avLst/>
-            </a:prstGeom>
-            <a:grpFill/>
-            <a:ln w="9525" cap="flat" cmpd="sng">
-              <a:solidFill>
-                <a:schemeClr val="dk2"/>
-              </a:solidFill>
-              <a:prstDash val="dot"/>
-              <a:round/>
-              <a:headEnd type="none" w="med" len="med"/>
-              <a:tailEnd type="none" w="med" len="med"/>
-            </a:ln>
-          </p:spPr>
-        </p:cxnSp>
-        <p:cxnSp>
-          <p:nvCxnSpPr>
-            <p:cNvPr id="207" name="Google Shape;207;p28"/>
-            <p:cNvCxnSpPr/>
-            <p:nvPr/>
-          </p:nvCxnSpPr>
-          <p:spPr>
-            <a:xfrm>
-              <a:off x="7232075" y="1766175"/>
-              <a:ext cx="1896000" cy="0"/>
-            </a:xfrm>
-            <a:prstGeom prst="straightConnector1">
-              <a:avLst/>
-            </a:prstGeom>
-            <a:grpFill/>
-            <a:ln w="9525" cap="flat" cmpd="sng">
-              <a:solidFill>
-                <a:schemeClr val="dk2"/>
-              </a:solidFill>
-              <a:prstDash val="dot"/>
-              <a:round/>
-              <a:headEnd type="none" w="med" len="med"/>
-              <a:tailEnd type="none" w="med" len="med"/>
-            </a:ln>
-          </p:spPr>
-        </p:cxnSp>
-      </p:grpSp>
       <p:cxnSp>
         <p:nvCxnSpPr>
           <p:cNvPr id="36" name="Google Shape;234;p30">
@@ -6657,6 +6657,94 @@
           </a:p>
         </p:txBody>
       </p:sp>
+      <p:pic>
+        <p:nvPicPr>
+          <p:cNvPr id="3" name="Picture 2" descr="A picture containing bird, flower&#10;&#10;Description automatically generated">
+            <a:extLst>
+              <a:ext uri="{FF2B5EF4-FFF2-40B4-BE49-F238E27FC236}">
+                <a16:creationId xmlns:a16="http://schemas.microsoft.com/office/drawing/2014/main" id="{25AE5ED4-9632-3C41-B81A-E5F88B180613}"/>
+              </a:ext>
+            </a:extLst>
+          </p:cNvPr>
+          <p:cNvPicPr>
+            <a:picLocks noChangeAspect="1"/>
+          </p:cNvPicPr>
+          <p:nvPr/>
+        </p:nvPicPr>
+        <p:blipFill rotWithShape="1">
+          <a:blip r:embed="rId3"/>
+          <a:srcRect l="16483" t="13916" r="14505" b="17796"/>
+          <a:stretch/>
+        </p:blipFill>
+        <p:spPr>
+          <a:xfrm>
+            <a:off x="9649402" y="243900"/>
+            <a:ext cx="2498967" cy="1648477"/>
+          </a:xfrm>
+          <a:prstGeom prst="rect">
+            <a:avLst/>
+          </a:prstGeom>
+        </p:spPr>
+      </p:pic>
+      <p:pic>
+        <p:nvPicPr>
+          <p:cNvPr id="5" name="Picture 4" descr="A screenshot of a cell phone&#10;&#10;Description automatically generated">
+            <a:extLst>
+              <a:ext uri="{FF2B5EF4-FFF2-40B4-BE49-F238E27FC236}">
+                <a16:creationId xmlns:a16="http://schemas.microsoft.com/office/drawing/2014/main" id="{4BC2A7A9-0A25-EE4A-AA99-D22884A28CA9}"/>
+              </a:ext>
+            </a:extLst>
+          </p:cNvPr>
+          <p:cNvPicPr>
+            <a:picLocks noChangeAspect="1"/>
+          </p:cNvPicPr>
+          <p:nvPr/>
+        </p:nvPicPr>
+        <p:blipFill>
+          <a:blip r:embed="rId4"/>
+          <a:stretch>
+            <a:fillRect/>
+          </a:stretch>
+        </p:blipFill>
+        <p:spPr>
+          <a:xfrm>
+            <a:off x="9052560" y="2156220"/>
+            <a:ext cx="3621024" cy="2414016"/>
+          </a:xfrm>
+          <a:prstGeom prst="rect">
+            <a:avLst/>
+          </a:prstGeom>
+        </p:spPr>
+      </p:pic>
+      <p:pic>
+        <p:nvPicPr>
+          <p:cNvPr id="7" name="Picture 6" descr="A screenshot of a cell phone&#10;&#10;Description automatically generated">
+            <a:extLst>
+              <a:ext uri="{FF2B5EF4-FFF2-40B4-BE49-F238E27FC236}">
+                <a16:creationId xmlns:a16="http://schemas.microsoft.com/office/drawing/2014/main" id="{350440C0-8A03-EA42-9DFE-256556D1D946}"/>
+              </a:ext>
+            </a:extLst>
+          </p:cNvPr>
+          <p:cNvPicPr>
+            <a:picLocks noChangeAspect="1"/>
+          </p:cNvPicPr>
+          <p:nvPr/>
+        </p:nvPicPr>
+        <p:blipFill rotWithShape="1">
+          <a:blip r:embed="rId5"/>
+          <a:srcRect l="14316" t="14687" r="13300" b="21055"/>
+          <a:stretch/>
+        </p:blipFill>
+        <p:spPr>
+          <a:xfrm>
+            <a:off x="9570968" y="4697946"/>
+            <a:ext cx="2621031" cy="1551195"/>
+          </a:xfrm>
+          <a:prstGeom prst="rect">
+            <a:avLst/>
+          </a:prstGeom>
+        </p:spPr>
+      </p:pic>
     </p:spTree>
     <p:extLst>
       <p:ext uri="{BB962C8B-B14F-4D97-AF65-F5344CB8AC3E}">
@@ -7893,7 +7981,7 @@
           </p:nvSpPr>
           <p:spPr>
             <a:xfrm>
-              <a:off x="7250413" y="1796075"/>
+              <a:off x="7250413" y="1395540"/>
               <a:ext cx="1806000" cy="545100"/>
             </a:xfrm>
             <a:prstGeom prst="rect">
@@ -8088,7 +8176,7 @@
           </p:nvCxnSpPr>
           <p:spPr>
             <a:xfrm>
-              <a:off x="7182188" y="3171475"/>
+              <a:off x="7182188" y="3315780"/>
               <a:ext cx="1896000" cy="0"/>
             </a:xfrm>
             <a:prstGeom prst="straightConnector1">
@@ -8114,7 +8202,7 @@
           </p:nvCxnSpPr>
           <p:spPr>
             <a:xfrm>
-              <a:off x="7177213" y="1755825"/>
+              <a:off x="7178741" y="1443546"/>
               <a:ext cx="1896000" cy="0"/>
             </a:xfrm>
             <a:prstGeom prst="straightConnector1">
@@ -8133,6 +8221,94 @@
           </p:spPr>
         </p:cxnSp>
       </p:grpSp>
+      <p:pic>
+        <p:nvPicPr>
+          <p:cNvPr id="7" name="Picture 6" descr="A picture containing bird, flower&#10;&#10;Description automatically generated">
+            <a:extLst>
+              <a:ext uri="{FF2B5EF4-FFF2-40B4-BE49-F238E27FC236}">
+                <a16:creationId xmlns:a16="http://schemas.microsoft.com/office/drawing/2014/main" id="{6D9B1C2F-B05F-1B44-AFD9-4371EE4880AD}"/>
+              </a:ext>
+            </a:extLst>
+          </p:cNvPr>
+          <p:cNvPicPr>
+            <a:picLocks noChangeAspect="1"/>
+          </p:cNvPicPr>
+          <p:nvPr/>
+        </p:nvPicPr>
+        <p:blipFill rotWithShape="1">
+          <a:blip r:embed="rId3"/>
+          <a:srcRect l="16886" t="13891" r="13300" b="21846"/>
+          <a:stretch/>
+        </p:blipFill>
+        <p:spPr>
+          <a:xfrm>
+            <a:off x="9663998" y="243900"/>
+            <a:ext cx="2528001" cy="1551309"/>
+          </a:xfrm>
+          <a:prstGeom prst="rect">
+            <a:avLst/>
+          </a:prstGeom>
+        </p:spPr>
+      </p:pic>
+      <p:pic>
+        <p:nvPicPr>
+          <p:cNvPr id="9" name="Picture 8" descr="A picture containing screenshot, bird, tree&#10;&#10;Description automatically generated">
+            <a:extLst>
+              <a:ext uri="{FF2B5EF4-FFF2-40B4-BE49-F238E27FC236}">
+                <a16:creationId xmlns:a16="http://schemas.microsoft.com/office/drawing/2014/main" id="{DE9FCB2B-F17A-5A43-9A7A-698DFCA3D636}"/>
+              </a:ext>
+            </a:extLst>
+          </p:cNvPr>
+          <p:cNvPicPr>
+            <a:picLocks noChangeAspect="1"/>
+          </p:cNvPicPr>
+          <p:nvPr/>
+        </p:nvPicPr>
+        <p:blipFill>
+          <a:blip r:embed="rId4"/>
+          <a:stretch>
+            <a:fillRect/>
+          </a:stretch>
+        </p:blipFill>
+        <p:spPr>
+          <a:xfrm>
+            <a:off x="9052560" y="2157984"/>
+            <a:ext cx="3621024" cy="2414016"/>
+          </a:xfrm>
+          <a:prstGeom prst="rect">
+            <a:avLst/>
+          </a:prstGeom>
+        </p:spPr>
+      </p:pic>
+      <p:pic>
+        <p:nvPicPr>
+          <p:cNvPr id="11" name="Picture 10" descr="A screenshot of a cell phone&#10;&#10;Description automatically generated">
+            <a:extLst>
+              <a:ext uri="{FF2B5EF4-FFF2-40B4-BE49-F238E27FC236}">
+                <a16:creationId xmlns:a16="http://schemas.microsoft.com/office/drawing/2014/main" id="{C3551042-4C88-F849-A7DB-BA096E6536D9}"/>
+              </a:ext>
+            </a:extLst>
+          </p:cNvPr>
+          <p:cNvPicPr>
+            <a:picLocks noChangeAspect="1"/>
+          </p:cNvPicPr>
+          <p:nvPr/>
+        </p:nvPicPr>
+        <p:blipFill rotWithShape="1">
+          <a:blip r:embed="rId5"/>
+          <a:srcRect l="15656" t="9469" r="10849" b="20259"/>
+          <a:stretch/>
+        </p:blipFill>
+        <p:spPr>
+          <a:xfrm>
+            <a:off x="9619488" y="4572000"/>
+            <a:ext cx="2661251" cy="1696360"/>
+          </a:xfrm>
+          <a:prstGeom prst="rect">
+            <a:avLst/>
+          </a:prstGeom>
+        </p:spPr>
+      </p:pic>
     </p:spTree>
     <p:extLst>
       <p:ext uri="{BB962C8B-B14F-4D97-AF65-F5344CB8AC3E}">
@@ -9231,7 +9407,7 @@
           </p:nvSpPr>
           <p:spPr>
             <a:xfrm>
-              <a:off x="595200" y="1796075"/>
+              <a:off x="595200" y="1405890"/>
               <a:ext cx="1806000" cy="545100"/>
             </a:xfrm>
             <a:prstGeom prst="rect">
@@ -9254,7 +9430,7 @@
                 </a:lnSpc>
               </a:pPr>
               <a:r>
-                <a:rPr lang="en" sz="1333" b="1">
+                <a:rPr lang="en" sz="1333" b="1" dirty="0">
                   <a:solidFill>
                     <a:srgbClr val="00297F"/>
                   </a:solidFill>
@@ -9265,7 +9441,7 @@
                 </a:rPr>
                 <a:t>Job Titles</a:t>
               </a:r>
-              <a:endParaRPr sz="1333" b="1">
+              <a:endParaRPr sz="1333" b="1" dirty="0">
                 <a:solidFill>
                   <a:srgbClr val="00297F"/>
                 </a:solidFill>
@@ -9281,7 +9457,7 @@
                   <a:spcPct val="150000"/>
                 </a:lnSpc>
               </a:pPr>
-              <a:endParaRPr sz="1333">
+              <a:endParaRPr sz="1333" dirty="0">
                 <a:solidFill>
                   <a:srgbClr val="00297F"/>
                 </a:solidFill>
@@ -9301,7 +9477,7 @@
           </p:nvCxnSpPr>
           <p:spPr>
             <a:xfrm>
-              <a:off x="526975" y="3171475"/>
+              <a:off x="526975" y="3326130"/>
               <a:ext cx="1896000" cy="0"/>
             </a:xfrm>
             <a:prstGeom prst="straightConnector1">
@@ -9327,7 +9503,7 @@
           </p:nvCxnSpPr>
           <p:spPr>
             <a:xfrm>
-              <a:off x="522000" y="1755825"/>
+              <a:off x="522641" y="1453896"/>
               <a:ext cx="1896000" cy="0"/>
             </a:xfrm>
             <a:prstGeom prst="straightConnector1">
@@ -9541,6 +9717,94 @@
           </a:p>
         </p:txBody>
       </p:sp>
+      <p:pic>
+        <p:nvPicPr>
+          <p:cNvPr id="3" name="Picture 2" descr="A picture containing bird, flower&#10;&#10;Description automatically generated">
+            <a:extLst>
+              <a:ext uri="{FF2B5EF4-FFF2-40B4-BE49-F238E27FC236}">
+                <a16:creationId xmlns:a16="http://schemas.microsoft.com/office/drawing/2014/main" id="{8F971F5D-1DEF-7D47-8D88-EF15CE6B8B4D}"/>
+              </a:ext>
+            </a:extLst>
+          </p:cNvPr>
+          <p:cNvPicPr>
+            <a:picLocks noChangeAspect="1"/>
+          </p:cNvPicPr>
+          <p:nvPr/>
+        </p:nvPicPr>
+        <p:blipFill rotWithShape="1">
+          <a:blip r:embed="rId3"/>
+          <a:srcRect l="16886" t="13212" r="13300" b="21846"/>
+          <a:stretch/>
+        </p:blipFill>
+        <p:spPr>
+          <a:xfrm>
+            <a:off x="9663998" y="227500"/>
+            <a:ext cx="2528001" cy="1567712"/>
+          </a:xfrm>
+          <a:prstGeom prst="rect">
+            <a:avLst/>
+          </a:prstGeom>
+        </p:spPr>
+      </p:pic>
+      <p:pic>
+        <p:nvPicPr>
+          <p:cNvPr id="5" name="Picture 4" descr="A screenshot of a cell phone&#10;&#10;Description automatically generated">
+            <a:extLst>
+              <a:ext uri="{FF2B5EF4-FFF2-40B4-BE49-F238E27FC236}">
+                <a16:creationId xmlns:a16="http://schemas.microsoft.com/office/drawing/2014/main" id="{E8302E9B-3D14-6B4E-932B-D97A69CFA880}"/>
+              </a:ext>
+            </a:extLst>
+          </p:cNvPr>
+          <p:cNvPicPr>
+            <a:picLocks noChangeAspect="1"/>
+          </p:cNvPicPr>
+          <p:nvPr/>
+        </p:nvPicPr>
+        <p:blipFill>
+          <a:blip r:embed="rId4"/>
+          <a:stretch>
+            <a:fillRect/>
+          </a:stretch>
+        </p:blipFill>
+        <p:spPr>
+          <a:xfrm>
+            <a:off x="9052560" y="2157984"/>
+            <a:ext cx="3621024" cy="2414016"/>
+          </a:xfrm>
+          <a:prstGeom prst="rect">
+            <a:avLst/>
+          </a:prstGeom>
+        </p:spPr>
+      </p:pic>
+      <p:pic>
+        <p:nvPicPr>
+          <p:cNvPr id="7" name="Picture 6" descr="A screenshot of a cell phone&#10;&#10;Description automatically generated">
+            <a:extLst>
+              <a:ext uri="{FF2B5EF4-FFF2-40B4-BE49-F238E27FC236}">
+                <a16:creationId xmlns:a16="http://schemas.microsoft.com/office/drawing/2014/main" id="{15479710-75E9-7644-9EA8-3E55FDF38CD0}"/>
+              </a:ext>
+            </a:extLst>
+          </p:cNvPr>
+          <p:cNvPicPr>
+            <a:picLocks noChangeAspect="1"/>
+          </p:cNvPicPr>
+          <p:nvPr/>
+        </p:nvPicPr>
+        <p:blipFill rotWithShape="1">
+          <a:blip r:embed="rId5"/>
+          <a:srcRect l="16886" t="13153" r="13300" b="20258"/>
+          <a:stretch/>
+        </p:blipFill>
+        <p:spPr>
+          <a:xfrm>
+            <a:off x="9663998" y="4660899"/>
+            <a:ext cx="2528002" cy="1607461"/>
+          </a:xfrm>
+          <a:prstGeom prst="rect">
+            <a:avLst/>
+          </a:prstGeom>
+        </p:spPr>
+      </p:pic>
     </p:spTree>
     <p:extLst>
       <p:ext uri="{BB962C8B-B14F-4D97-AF65-F5344CB8AC3E}">
@@ -10756,7 +11020,7 @@
         </p:nvSpPr>
         <p:spPr>
           <a:xfrm>
-            <a:off x="9687867" y="2394767"/>
+            <a:off x="9687867" y="1874520"/>
             <a:ext cx="2408000" cy="726800"/>
           </a:xfrm>
           <a:prstGeom prst="rect">
@@ -10779,7 +11043,7 @@
               </a:lnSpc>
             </a:pPr>
             <a:r>
-              <a:rPr lang="en" sz="1333" b="1">
+              <a:rPr lang="en" sz="1333" b="1" dirty="0">
                 <a:solidFill>
                   <a:srgbClr val="00297F"/>
                 </a:solidFill>
@@ -10790,7 +11054,7 @@
               </a:rPr>
               <a:t>Job Titles</a:t>
             </a:r>
-            <a:endParaRPr sz="1333" b="1">
+            <a:endParaRPr sz="1333" b="1" dirty="0">
               <a:solidFill>
                 <a:srgbClr val="00297F"/>
               </a:solidFill>
@@ -10806,7 +11070,7 @@
                 <a:spcPct val="150000"/>
               </a:lnSpc>
             </a:pPr>
-            <a:endParaRPr sz="1333">
+            <a:endParaRPr sz="1333" dirty="0">
               <a:solidFill>
                 <a:srgbClr val="00297F"/>
               </a:solidFill>
@@ -10826,7 +11090,7 @@
         </p:nvCxnSpPr>
         <p:spPr>
           <a:xfrm>
-            <a:off x="9596900" y="4228633"/>
+            <a:off x="9596900" y="4434840"/>
             <a:ext cx="2528000" cy="0"/>
           </a:xfrm>
           <a:prstGeom prst="straightConnector1">
@@ -10852,7 +11116,7 @@
         </p:nvCxnSpPr>
         <p:spPr>
           <a:xfrm>
-            <a:off x="9590267" y="2341100"/>
+            <a:off x="9590267" y="1938528"/>
             <a:ext cx="2528000" cy="0"/>
           </a:xfrm>
           <a:prstGeom prst="straightConnector1">
@@ -11015,10 +11279,10 @@
       </p:sp>
       <p:pic>
         <p:nvPicPr>
-          <p:cNvPr id="2" name="Picture 1">
+          <p:cNvPr id="5" name="Picture 4" descr="A screenshot of a tree&#10;&#10;Description automatically generated">
             <a:extLst>
               <a:ext uri="{FF2B5EF4-FFF2-40B4-BE49-F238E27FC236}">
-                <a16:creationId xmlns:a16="http://schemas.microsoft.com/office/drawing/2014/main" id="{DFADCF9B-A263-B745-AE2F-21DA85F3A30A}"/>
+                <a16:creationId xmlns:a16="http://schemas.microsoft.com/office/drawing/2014/main" id="{47AFF098-5E32-0248-BFB8-6262835B8E33}"/>
               </a:ext>
             </a:extLst>
           </p:cNvPr>
@@ -11027,16 +11291,15 @@
           </p:cNvPicPr>
           <p:nvPr/>
         </p:nvPicPr>
-        <p:blipFill>
+        <p:blipFill rotWithShape="1">
           <a:blip r:embed="rId3"/>
-          <a:stretch>
-            <a:fillRect/>
-          </a:stretch>
+          <a:srcRect l="14534" t="13212" r="15152" b="21846"/>
+          <a:stretch/>
         </p:blipFill>
         <p:spPr>
           <a:xfrm>
-            <a:off x="9687867" y="4682203"/>
-            <a:ext cx="2334024" cy="1531885"/>
+            <a:off x="9578832" y="227500"/>
+            <a:ext cx="2546067" cy="1567712"/>
           </a:xfrm>
           <a:prstGeom prst="rect">
             <a:avLst/>
@@ -11045,10 +11308,10 @@
       </p:pic>
       <p:pic>
         <p:nvPicPr>
-          <p:cNvPr id="4" name="Picture 3">
+          <p:cNvPr id="7" name="Picture 6" descr="A screenshot of a cell phone&#10;&#10;Description automatically generated">
             <a:extLst>
               <a:ext uri="{FF2B5EF4-FFF2-40B4-BE49-F238E27FC236}">
-                <a16:creationId xmlns:a16="http://schemas.microsoft.com/office/drawing/2014/main" id="{5BE3EB0D-FE98-5244-800E-F021A8D22B8D}"/>
+                <a16:creationId xmlns:a16="http://schemas.microsoft.com/office/drawing/2014/main" id="{36B4C114-6127-7449-B215-02A14877669C}"/>
               </a:ext>
             </a:extLst>
           </p:cNvPr>
@@ -11065,8 +11328,37 @@
         </p:blipFill>
         <p:spPr>
           <a:xfrm>
-            <a:off x="9819751" y="2930709"/>
-            <a:ext cx="2211099" cy="1288853"/>
+            <a:off x="9052560" y="1865884"/>
+            <a:ext cx="3621024" cy="2414016"/>
+          </a:xfrm>
+          <a:prstGeom prst="rect">
+            <a:avLst/>
+          </a:prstGeom>
+        </p:spPr>
+      </p:pic>
+      <p:pic>
+        <p:nvPicPr>
+          <p:cNvPr id="9" name="Picture 8" descr="A screenshot of a cell phone&#10;&#10;Description automatically generated">
+            <a:extLst>
+              <a:ext uri="{FF2B5EF4-FFF2-40B4-BE49-F238E27FC236}">
+                <a16:creationId xmlns:a16="http://schemas.microsoft.com/office/drawing/2014/main" id="{D3316AF9-407D-4C41-A23D-F77DB6A81F1A}"/>
+              </a:ext>
+            </a:extLst>
+          </p:cNvPr>
+          <p:cNvPicPr>
+            <a:picLocks noChangeAspect="1"/>
+          </p:cNvPicPr>
+          <p:nvPr/>
+        </p:nvPicPr>
+        <p:blipFill rotWithShape="1">
+          <a:blip r:embed="rId5"/>
+          <a:srcRect l="16478" t="13424" r="13300" b="20259"/>
+          <a:stretch/>
+        </p:blipFill>
+        <p:spPr>
+          <a:xfrm>
+            <a:off x="9649232" y="4667484"/>
+            <a:ext cx="2542768" cy="1600875"/>
           </a:xfrm>
           <a:prstGeom prst="rect">
             <a:avLst/>
@@ -12313,7 +12605,7 @@
           </p:nvSpPr>
           <p:spPr>
             <a:xfrm>
-              <a:off x="7220075" y="1796075"/>
+              <a:off x="7220075" y="1405890"/>
               <a:ext cx="1806000" cy="545100"/>
             </a:xfrm>
             <a:prstGeom prst="rect">
@@ -12336,7 +12628,7 @@
                 </a:lnSpc>
               </a:pPr>
               <a:r>
-                <a:rPr lang="en" sz="1333" b="1">
+                <a:rPr lang="en" sz="1333" b="1" dirty="0">
                   <a:solidFill>
                     <a:srgbClr val="00297F"/>
                   </a:solidFill>
@@ -12347,7 +12639,7 @@
                 </a:rPr>
                 <a:t>Job Titles</a:t>
               </a:r>
-              <a:endParaRPr sz="1333" b="1">
+              <a:endParaRPr sz="1333" b="1" dirty="0">
                 <a:solidFill>
                   <a:srgbClr val="00297F"/>
                 </a:solidFill>
@@ -12363,7 +12655,7 @@
                   <a:spcPct val="150000"/>
                 </a:lnSpc>
               </a:pPr>
-              <a:endParaRPr sz="1333">
+              <a:endParaRPr sz="1333" dirty="0">
                 <a:solidFill>
                   <a:srgbClr val="00297F"/>
                 </a:solidFill>
@@ -12383,7 +12675,7 @@
           </p:nvCxnSpPr>
           <p:spPr>
             <a:xfrm>
-              <a:off x="7151850" y="3171475"/>
+              <a:off x="7151850" y="3326130"/>
               <a:ext cx="1896000" cy="0"/>
             </a:xfrm>
             <a:prstGeom prst="straightConnector1">
@@ -12409,7 +12701,7 @@
           </p:nvCxnSpPr>
           <p:spPr>
             <a:xfrm>
-              <a:off x="7146875" y="1755825"/>
+              <a:off x="7146875" y="1453896"/>
               <a:ext cx="1896000" cy="0"/>
             </a:xfrm>
             <a:prstGeom prst="straightConnector1">
@@ -12571,6 +12863,94 @@
           </a:p>
         </p:txBody>
       </p:sp>
+      <p:pic>
+        <p:nvPicPr>
+          <p:cNvPr id="3" name="Picture 2" descr="A picture containing bird, flower&#10;&#10;Description automatically generated">
+            <a:extLst>
+              <a:ext uri="{FF2B5EF4-FFF2-40B4-BE49-F238E27FC236}">
+                <a16:creationId xmlns:a16="http://schemas.microsoft.com/office/drawing/2014/main" id="{6E1D5B84-34EF-E147-9D99-84902A653259}"/>
+              </a:ext>
+            </a:extLst>
+          </p:cNvPr>
+          <p:cNvPicPr>
+            <a:picLocks noChangeAspect="1"/>
+          </p:cNvPicPr>
+          <p:nvPr/>
+        </p:nvPicPr>
+        <p:blipFill rotWithShape="1">
+          <a:blip r:embed="rId3"/>
+          <a:srcRect l="16384" t="13891" r="13003" b="21846"/>
+          <a:stretch/>
+        </p:blipFill>
+        <p:spPr>
+          <a:xfrm>
+            <a:off x="9645800" y="243900"/>
+            <a:ext cx="2556933" cy="1551312"/>
+          </a:xfrm>
+          <a:prstGeom prst="rect">
+            <a:avLst/>
+          </a:prstGeom>
+        </p:spPr>
+      </p:pic>
+      <p:pic>
+        <p:nvPicPr>
+          <p:cNvPr id="5" name="Picture 4" descr="A screenshot of a cell phone&#10;&#10;Description automatically generated">
+            <a:extLst>
+              <a:ext uri="{FF2B5EF4-FFF2-40B4-BE49-F238E27FC236}">
+                <a16:creationId xmlns:a16="http://schemas.microsoft.com/office/drawing/2014/main" id="{D1AF484D-B22A-BF40-AF93-CC7D16C6A53D}"/>
+              </a:ext>
+            </a:extLst>
+          </p:cNvPr>
+          <p:cNvPicPr>
+            <a:picLocks noChangeAspect="1"/>
+          </p:cNvPicPr>
+          <p:nvPr/>
+        </p:nvPicPr>
+        <p:blipFill>
+          <a:blip r:embed="rId4"/>
+          <a:stretch>
+            <a:fillRect/>
+          </a:stretch>
+        </p:blipFill>
+        <p:spPr>
+          <a:xfrm>
+            <a:off x="9052560" y="2157984"/>
+            <a:ext cx="3621024" cy="2414016"/>
+          </a:xfrm>
+          <a:prstGeom prst="rect">
+            <a:avLst/>
+          </a:prstGeom>
+        </p:spPr>
+      </p:pic>
+      <p:pic>
+        <p:nvPicPr>
+          <p:cNvPr id="7" name="Picture 6" descr="A screenshot of a cell phone&#10;&#10;Description automatically generated">
+            <a:extLst>
+              <a:ext uri="{FF2B5EF4-FFF2-40B4-BE49-F238E27FC236}">
+                <a16:creationId xmlns:a16="http://schemas.microsoft.com/office/drawing/2014/main" id="{3B9998D2-8D0B-1D47-BC1C-EF01CEA67129}"/>
+              </a:ext>
+            </a:extLst>
+          </p:cNvPr>
+          <p:cNvPicPr>
+            <a:picLocks noChangeAspect="1"/>
+          </p:cNvPicPr>
+          <p:nvPr/>
+        </p:nvPicPr>
+        <p:blipFill rotWithShape="1">
+          <a:blip r:embed="rId5"/>
+          <a:srcRect l="15172" t="13153" r="13300" b="20259"/>
+          <a:stretch/>
+        </p:blipFill>
+        <p:spPr>
+          <a:xfrm>
+            <a:off x="9601934" y="4660900"/>
+            <a:ext cx="2590066" cy="1607458"/>
+          </a:xfrm>
+          <a:prstGeom prst="rect">
+            <a:avLst/>
+          </a:prstGeom>
+        </p:spPr>
+      </p:pic>
     </p:spTree>
     <p:extLst>
       <p:ext uri="{BB962C8B-B14F-4D97-AF65-F5344CB8AC3E}">

</xml_diff>